<commit_message>
improve tech presentation for pos dealers
</commit_message>
<xml_diff>
--- a/for-posdealers/presentation/media/posdealer-tech-rollout.pptx
+++ b/for-posdealers/presentation/media/posdealer-tech-rollout.pptx
@@ -5,10 +5,10 @@
     <p:sldMasterId id="2147483672" r:id="rId4"/>
   </p:sldMasterIdLst>
   <p:notesMasterIdLst>
-    <p:notesMasterId r:id="rId25"/>
+    <p:notesMasterId r:id="rId27"/>
   </p:notesMasterIdLst>
   <p:handoutMasterIdLst>
-    <p:handoutMasterId r:id="rId26"/>
+    <p:handoutMasterId r:id="rId28"/>
   </p:handoutMasterIdLst>
   <p:sldIdLst>
     <p:sldId id="1640" r:id="rId5"/>
@@ -31,6 +31,8 @@
     <p:sldId id="1657" r:id="rId22"/>
     <p:sldId id="1658" r:id="rId23"/>
     <p:sldId id="1659" r:id="rId24"/>
+    <p:sldId id="1660" r:id="rId25"/>
+    <p:sldId id="1661" r:id="rId26"/>
   </p:sldIdLst>
   <p:sldSz cx="12192000" cy="6858000"/>
   <p:notesSz cx="7104063" cy="10234613"/>
@@ -162,6 +164,8 @@
             <p14:sldId id="1657"/>
             <p14:sldId id="1658"/>
             <p14:sldId id="1659"/>
+            <p14:sldId id="1660"/>
+            <p14:sldId id="1661"/>
           </p14:sldIdLst>
         </p14:section>
       </p14:sectionLst>
@@ -4361,103 +4365,53 @@
           <a:bodyPr/>
           <a:lstStyle/>
           <a:p>
-            <a:pPr marL="0" marR="0" lvl="0" indent="0" algn="l" defTabSz="914400" rtl="0" eaLnBrk="1" fontAlgn="auto" latinLnBrk="0" hangingPunct="1">
-              <a:lnSpc>
-                <a:spcPct val="100000"/>
-              </a:lnSpc>
-              <a:spcBef>
-                <a:spcPts val="0"/>
-              </a:spcBef>
-              <a:spcAft>
-                <a:spcPts val="0"/>
-              </a:spcAft>
-              <a:buClrTx/>
-              <a:buSzTx/>
+            <a:r>
+              <a:rPr lang="de-DE" dirty="0"/>
+              <a:t>Wir werden auf folgende Themen eingehen:</a:t>
+            </a:r>
+          </a:p>
+          <a:p>
+            <a:r>
+              <a:rPr lang="de-DE" dirty="0"/>
+              <a:t>-  Das fiskaltrust Portal wird als Rollout Management Tool verwendet. Es unterstützt Kassenhändler bei der Vorbereitung und Ausführung des Rollout.</a:t>
+            </a:r>
+          </a:p>
+          <a:p>
+            <a:pPr marL="171450" indent="-171450">
               <a:buFontTx/>
-              <a:buNone/>
-              <a:tabLst/>
-              <a:defRPr/>
+              <a:buChar char="-"/>
             </a:pPr>
             <a:r>
-              <a:rPr lang="de-DE" sz="1100" dirty="0"/>
-              <a:t>Portal als Rollout Management Tool: Das Portal wird von Kassenhändler als Rollout Management Tool genutzt. </a:t>
-            </a:r>
-          </a:p>
-          <a:p>
-            <a:endParaRPr lang="de-DE" sz="1100" b="1" dirty="0"/>
-          </a:p>
-          <a:p>
-            <a:r>
-              <a:rPr lang="de-DE" sz="1100" b="1" dirty="0"/>
-              <a:t>Live und Sandbox Portal</a:t>
-            </a:r>
-            <a:r>
-              <a:rPr lang="de-DE" sz="1100" dirty="0"/>
-              <a:t>: fiskaltrust stellt neben der Live-Umgebung auch eine Testumgebung namens Sandbox zur Verfügung</a:t>
-            </a:r>
-          </a:p>
-          <a:p>
-            <a:r>
-              <a:rPr lang="de-DE" sz="1100" dirty="0"/>
-              <a:t>(https://</a:t>
-            </a:r>
-            <a:r>
-              <a:rPr lang="de-DE" sz="1100" dirty="0" err="1"/>
-              <a:t>portal.fiskaltrust.de</a:t>
-            </a:r>
-            <a:r>
-              <a:rPr lang="de-DE" sz="1100" dirty="0"/>
-              <a:t> und https://portal-</a:t>
-            </a:r>
-            <a:r>
-              <a:rPr lang="de-DE" sz="1100" dirty="0" err="1"/>
-              <a:t>sandbox.fiskaltrust.de</a:t>
-            </a:r>
-            <a:r>
-              <a:rPr lang="de-DE" sz="1100" dirty="0"/>
-              <a:t>)</a:t>
-            </a:r>
-          </a:p>
-          <a:p>
-            <a:endParaRPr lang="de-DE" sz="1100" dirty="0"/>
-          </a:p>
-          <a:p>
-            <a:pPr marL="0" marR="0" lvl="0" indent="0" algn="l" defTabSz="914400" rtl="0" eaLnBrk="1" fontAlgn="auto" latinLnBrk="0" hangingPunct="1">
-              <a:lnSpc>
-                <a:spcPct val="100000"/>
-              </a:lnSpc>
-              <a:spcBef>
-                <a:spcPts val="0"/>
-              </a:spcBef>
-              <a:spcAft>
-                <a:spcPts val="0"/>
-              </a:spcAft>
-              <a:buClrTx/>
-              <a:buSzTx/>
+              <a:rPr lang="de-DE" dirty="0"/>
+              <a:t>Die Middleware muss vor der Auslieferung spezifisch auf die Gegebenheiten des Betreibers Konfiguriert werden. Wir werden erläutern, wie diese Konfiguration mit Hilfe des Portals vorgenommen werden kann, was genau konfiguriert werden muss und wie nach der Konfiguration die Auslieferung der Middleware über das Portal erfolgen kann (manueller Download des Launcher)</a:t>
+            </a:r>
+          </a:p>
+          <a:p>
+            <a:pPr marL="171450" indent="-171450">
               <a:buFontTx/>
-              <a:buNone/>
-              <a:tabLst/>
-              <a:defRPr/>
+              <a:buChar char="-"/>
             </a:pPr>
             <a:r>
-              <a:rPr lang="de-DE" sz="1100" dirty="0"/>
-              <a:t>Im Folgenden werden wir die Punkte: Einladung der Kassenbetreiber, Vorbereitung der Konfiguration und Download des Launcher behandeln</a:t>
-            </a:r>
-          </a:p>
-          <a:p>
-            <a:endParaRPr lang="de-DE" sz="1100" dirty="0"/>
-          </a:p>
-          <a:p>
-            <a:endParaRPr lang="de-DE" sz="1100" dirty="0"/>
-          </a:p>
-          <a:p>
-            <a:endParaRPr lang="de-DE" sz="1100" dirty="0"/>
-          </a:p>
-          <a:p>
-            <a:endParaRPr lang="de-DE" sz="1100" dirty="0"/>
-          </a:p>
-          <a:p>
-            <a:endParaRPr lang="de-DE" sz="1100" dirty="0"/>
+              <a:rPr lang="de-DE" dirty="0"/>
+              <a:t>Als nächstes werden wir unsere Automatisierungsoptionen vorstellen die Kassenherstellern ermöglichen bei einem Rollout mit vielen betroffenen Kassen einen Massenrollout durchzuführen</a:t>
+            </a:r>
+          </a:p>
+          <a:p>
+            <a:pPr marL="171450" indent="-171450">
+              <a:buFontTx/>
+              <a:buChar char="-"/>
+            </a:pPr>
+            <a:r>
+              <a:rPr lang="de-DE" dirty="0"/>
+              <a:t>Zum Schluss stellen wir diverse Rollout-Szenarien vor, die die Flexibilität unserer Lösung verdeutlichen</a:t>
+            </a:r>
+          </a:p>
+          <a:p>
+            <a:pPr marL="171450" indent="-171450">
+              <a:buFontTx/>
+              <a:buChar char="-"/>
+            </a:pPr>
+            <a:endParaRPr lang="de-DE" dirty="0"/>
           </a:p>
         </p:txBody>
       </p:sp>
@@ -4524,7 +4478,7 @@
           <a:p>
             <a:fld id="{37D9B929-EEB3-453F-899C-B5737EAC3251}" type="slidenum">
               <a:rPr lang="de-AT" smtClean="0"/>
-              <a:t>3</a:t>
+              <a:t>2</a:t>
             </a:fld>
             <a:endParaRPr lang="de-AT"/>
           </a:p>
@@ -4533,7 +4487,7 @@
     </p:spTree>
     <p:extLst>
       <p:ext uri="{BB962C8B-B14F-4D97-AF65-F5344CB8AC3E}">
-        <p14:creationId xmlns:p14="http://schemas.microsoft.com/office/powerpoint/2010/main" val="1532984696"/>
+        <p14:creationId xmlns:p14="http://schemas.microsoft.com/office/powerpoint/2010/main" val="1038178982"/>
       </p:ext>
     </p:extLst>
   </p:cSld>
@@ -4654,6 +4608,396 @@
           <a:p>
             <a:fld id="{37D9B929-EEB3-453F-899C-B5737EAC3251}" type="slidenum">
               <a:rPr lang="de-AT" smtClean="0"/>
+              <a:t>11</a:t>
+            </a:fld>
+            <a:endParaRPr lang="de-AT"/>
+          </a:p>
+        </p:txBody>
+      </p:sp>
+    </p:spTree>
+    <p:extLst>
+      <p:ext uri="{BB962C8B-B14F-4D97-AF65-F5344CB8AC3E}">
+        <p14:creationId xmlns:p14="http://schemas.microsoft.com/office/powerpoint/2010/main" val="1480655448"/>
+      </p:ext>
+    </p:extLst>
+  </p:cSld>
+  <p:clrMapOvr>
+    <a:masterClrMapping/>
+  </p:clrMapOvr>
+</p:notes>
+</file>
+
+<file path=ppt/notesSlides/notesSlide11.xml><?xml version="1.0" encoding="utf-8"?>
+<p:notes xmlns:a="http://schemas.openxmlformats.org/drawingml/2006/main" xmlns:r="http://schemas.openxmlformats.org/officeDocument/2006/relationships" xmlns:p="http://schemas.openxmlformats.org/presentationml/2006/main">
+  <p:cSld>
+    <p:spTree>
+      <p:nvGrpSpPr>
+        <p:cNvPr id="1" name=""/>
+        <p:cNvGrpSpPr/>
+        <p:nvPr/>
+      </p:nvGrpSpPr>
+      <p:grpSpPr>
+        <a:xfrm>
+          <a:off x="0" y="0"/>
+          <a:ext cx="0" cy="0"/>
+          <a:chOff x="0" y="0"/>
+          <a:chExt cx="0" cy="0"/>
+        </a:xfrm>
+      </p:grpSpPr>
+      <p:sp>
+        <p:nvSpPr>
+          <p:cNvPr id="2" name="Slide Image Placeholder 1"/>
+          <p:cNvSpPr>
+            <a:spLocks noGrp="1" noRot="1" noChangeAspect="1"/>
+          </p:cNvSpPr>
+          <p:nvPr>
+            <p:ph type="sldImg"/>
+          </p:nvPr>
+        </p:nvSpPr>
+        <p:spPr/>
+      </p:sp>
+      <p:sp>
+        <p:nvSpPr>
+          <p:cNvPr id="3" name="Notes Placeholder 2"/>
+          <p:cNvSpPr>
+            <a:spLocks noGrp="1"/>
+          </p:cNvSpPr>
+          <p:nvPr>
+            <p:ph type="body" idx="1"/>
+          </p:nvPr>
+        </p:nvSpPr>
+        <p:spPr/>
+        <p:txBody>
+          <a:bodyPr/>
+          <a:lstStyle/>
+          <a:p>
+            <a:endParaRPr lang="de-DE" dirty="0"/>
+          </a:p>
+        </p:txBody>
+      </p:sp>
+      <p:sp>
+        <p:nvSpPr>
+          <p:cNvPr id="4" name="Header Placeholder 3"/>
+          <p:cNvSpPr>
+            <a:spLocks noGrp="1"/>
+          </p:cNvSpPr>
+          <p:nvPr>
+            <p:ph type="hdr" sz="quarter"/>
+          </p:nvPr>
+        </p:nvSpPr>
+        <p:spPr/>
+        <p:txBody>
+          <a:bodyPr/>
+          <a:lstStyle/>
+          <a:p>
+            <a:r>
+              <a:rPr lang="de-AT"/>
+              <a:t>fiskaltrust. consulting gmbh - confidential</a:t>
+            </a:r>
+            <a:endParaRPr lang="de-AT" dirty="0"/>
+          </a:p>
+        </p:txBody>
+      </p:sp>
+      <p:sp>
+        <p:nvSpPr>
+          <p:cNvPr id="5" name="Date Placeholder 4"/>
+          <p:cNvSpPr>
+            <a:spLocks noGrp="1"/>
+          </p:cNvSpPr>
+          <p:nvPr>
+            <p:ph type="dt" idx="1"/>
+          </p:nvPr>
+        </p:nvSpPr>
+        <p:spPr/>
+        <p:txBody>
+          <a:bodyPr/>
+          <a:lstStyle/>
+          <a:p>
+            <a:fld id="{E52F4C69-7549-4A71-BB0C-341D25F594E8}" type="datetime1">
+              <a:rPr lang="de-AT" smtClean="0"/>
+              <a:t>08.09.20</a:t>
+            </a:fld>
+            <a:endParaRPr lang="de-AT"/>
+          </a:p>
+        </p:txBody>
+      </p:sp>
+      <p:sp>
+        <p:nvSpPr>
+          <p:cNvPr id="6" name="Slide Number Placeholder 5"/>
+          <p:cNvSpPr>
+            <a:spLocks noGrp="1"/>
+          </p:cNvSpPr>
+          <p:nvPr>
+            <p:ph type="sldNum" sz="quarter" idx="5"/>
+          </p:nvPr>
+        </p:nvSpPr>
+        <p:spPr/>
+        <p:txBody>
+          <a:bodyPr/>
+          <a:lstStyle/>
+          <a:p>
+            <a:fld id="{37D9B929-EEB3-453F-899C-B5737EAC3251}" type="slidenum">
+              <a:rPr lang="de-AT" smtClean="0"/>
+              <a:t>15</a:t>
+            </a:fld>
+            <a:endParaRPr lang="de-AT"/>
+          </a:p>
+        </p:txBody>
+      </p:sp>
+    </p:spTree>
+    <p:extLst>
+      <p:ext uri="{BB962C8B-B14F-4D97-AF65-F5344CB8AC3E}">
+        <p14:creationId xmlns:p14="http://schemas.microsoft.com/office/powerpoint/2010/main" val="1458951094"/>
+      </p:ext>
+    </p:extLst>
+  </p:cSld>
+  <p:clrMapOvr>
+    <a:masterClrMapping/>
+  </p:clrMapOvr>
+</p:notes>
+</file>
+
+<file path=ppt/notesSlides/notesSlide12.xml><?xml version="1.0" encoding="utf-8"?>
+<p:notes xmlns:a="http://schemas.openxmlformats.org/drawingml/2006/main" xmlns:r="http://schemas.openxmlformats.org/officeDocument/2006/relationships" xmlns:p="http://schemas.openxmlformats.org/presentationml/2006/main">
+  <p:cSld>
+    <p:spTree>
+      <p:nvGrpSpPr>
+        <p:cNvPr id="1" name=""/>
+        <p:cNvGrpSpPr/>
+        <p:nvPr/>
+      </p:nvGrpSpPr>
+      <p:grpSpPr>
+        <a:xfrm>
+          <a:off x="0" y="0"/>
+          <a:ext cx="0" cy="0"/>
+          <a:chOff x="0" y="0"/>
+          <a:chExt cx="0" cy="0"/>
+        </a:xfrm>
+      </p:grpSpPr>
+      <p:sp>
+        <p:nvSpPr>
+          <p:cNvPr id="2" name="Slide Image Placeholder 1"/>
+          <p:cNvSpPr>
+            <a:spLocks noGrp="1" noRot="1" noChangeAspect="1"/>
+          </p:cNvSpPr>
+          <p:nvPr>
+            <p:ph type="sldImg"/>
+          </p:nvPr>
+        </p:nvSpPr>
+        <p:spPr/>
+      </p:sp>
+      <p:sp>
+        <p:nvSpPr>
+          <p:cNvPr id="3" name="Notes Placeholder 2"/>
+          <p:cNvSpPr>
+            <a:spLocks noGrp="1"/>
+          </p:cNvSpPr>
+          <p:nvPr>
+            <p:ph type="body" idx="1"/>
+          </p:nvPr>
+        </p:nvSpPr>
+        <p:spPr/>
+        <p:txBody>
+          <a:bodyPr/>
+          <a:lstStyle/>
+          <a:p>
+            <a:endParaRPr lang="de-DE" dirty="0"/>
+          </a:p>
+        </p:txBody>
+      </p:sp>
+      <p:sp>
+        <p:nvSpPr>
+          <p:cNvPr id="4" name="Header Placeholder 3"/>
+          <p:cNvSpPr>
+            <a:spLocks noGrp="1"/>
+          </p:cNvSpPr>
+          <p:nvPr>
+            <p:ph type="hdr" sz="quarter"/>
+          </p:nvPr>
+        </p:nvSpPr>
+        <p:spPr/>
+        <p:txBody>
+          <a:bodyPr/>
+          <a:lstStyle/>
+          <a:p>
+            <a:r>
+              <a:rPr lang="de-AT"/>
+              <a:t>fiskaltrust. consulting gmbh - confidential</a:t>
+            </a:r>
+            <a:endParaRPr lang="de-AT" dirty="0"/>
+          </a:p>
+        </p:txBody>
+      </p:sp>
+      <p:sp>
+        <p:nvSpPr>
+          <p:cNvPr id="5" name="Date Placeholder 4"/>
+          <p:cNvSpPr>
+            <a:spLocks noGrp="1"/>
+          </p:cNvSpPr>
+          <p:nvPr>
+            <p:ph type="dt" idx="1"/>
+          </p:nvPr>
+        </p:nvSpPr>
+        <p:spPr/>
+        <p:txBody>
+          <a:bodyPr/>
+          <a:lstStyle/>
+          <a:p>
+            <a:fld id="{E52F4C69-7549-4A71-BB0C-341D25F594E8}" type="datetime1">
+              <a:rPr lang="de-AT" smtClean="0"/>
+              <a:t>08.09.20</a:t>
+            </a:fld>
+            <a:endParaRPr lang="de-AT"/>
+          </a:p>
+        </p:txBody>
+      </p:sp>
+      <p:sp>
+        <p:nvSpPr>
+          <p:cNvPr id="6" name="Slide Number Placeholder 5"/>
+          <p:cNvSpPr>
+            <a:spLocks noGrp="1"/>
+          </p:cNvSpPr>
+          <p:nvPr>
+            <p:ph type="sldNum" sz="quarter" idx="5"/>
+          </p:nvPr>
+        </p:nvSpPr>
+        <p:spPr/>
+        <p:txBody>
+          <a:bodyPr/>
+          <a:lstStyle/>
+          <a:p>
+            <a:fld id="{37D9B929-EEB3-453F-899C-B5737EAC3251}" type="slidenum">
+              <a:rPr lang="de-AT" smtClean="0"/>
+              <a:t>17</a:t>
+            </a:fld>
+            <a:endParaRPr lang="de-AT"/>
+          </a:p>
+        </p:txBody>
+      </p:sp>
+    </p:spTree>
+    <p:extLst>
+      <p:ext uri="{BB962C8B-B14F-4D97-AF65-F5344CB8AC3E}">
+        <p14:creationId xmlns:p14="http://schemas.microsoft.com/office/powerpoint/2010/main" val="385413735"/>
+      </p:ext>
+    </p:extLst>
+  </p:cSld>
+  <p:clrMapOvr>
+    <a:masterClrMapping/>
+  </p:clrMapOvr>
+</p:notes>
+</file>
+
+<file path=ppt/notesSlides/notesSlide13.xml><?xml version="1.0" encoding="utf-8"?>
+<p:notes xmlns:a="http://schemas.openxmlformats.org/drawingml/2006/main" xmlns:r="http://schemas.openxmlformats.org/officeDocument/2006/relationships" xmlns:p="http://schemas.openxmlformats.org/presentationml/2006/main">
+  <p:cSld>
+    <p:spTree>
+      <p:nvGrpSpPr>
+        <p:cNvPr id="1" name=""/>
+        <p:cNvGrpSpPr/>
+        <p:nvPr/>
+      </p:nvGrpSpPr>
+      <p:grpSpPr>
+        <a:xfrm>
+          <a:off x="0" y="0"/>
+          <a:ext cx="0" cy="0"/>
+          <a:chOff x="0" y="0"/>
+          <a:chExt cx="0" cy="0"/>
+        </a:xfrm>
+      </p:grpSpPr>
+      <p:sp>
+        <p:nvSpPr>
+          <p:cNvPr id="2" name="Slide Image Placeholder 1"/>
+          <p:cNvSpPr>
+            <a:spLocks noGrp="1" noRot="1" noChangeAspect="1"/>
+          </p:cNvSpPr>
+          <p:nvPr>
+            <p:ph type="sldImg"/>
+          </p:nvPr>
+        </p:nvSpPr>
+        <p:spPr/>
+      </p:sp>
+      <p:sp>
+        <p:nvSpPr>
+          <p:cNvPr id="3" name="Notes Placeholder 2"/>
+          <p:cNvSpPr>
+            <a:spLocks noGrp="1"/>
+          </p:cNvSpPr>
+          <p:nvPr>
+            <p:ph type="body" idx="1"/>
+          </p:nvPr>
+        </p:nvSpPr>
+        <p:spPr/>
+        <p:txBody>
+          <a:bodyPr/>
+          <a:lstStyle/>
+          <a:p>
+            <a:endParaRPr lang="de-DE" dirty="0"/>
+          </a:p>
+        </p:txBody>
+      </p:sp>
+      <p:sp>
+        <p:nvSpPr>
+          <p:cNvPr id="4" name="Header Placeholder 3"/>
+          <p:cNvSpPr>
+            <a:spLocks noGrp="1"/>
+          </p:cNvSpPr>
+          <p:nvPr>
+            <p:ph type="hdr" sz="quarter"/>
+          </p:nvPr>
+        </p:nvSpPr>
+        <p:spPr/>
+        <p:txBody>
+          <a:bodyPr/>
+          <a:lstStyle/>
+          <a:p>
+            <a:r>
+              <a:rPr lang="de-AT"/>
+              <a:t>fiskaltrust. consulting gmbh - confidential</a:t>
+            </a:r>
+            <a:endParaRPr lang="de-AT" dirty="0"/>
+          </a:p>
+        </p:txBody>
+      </p:sp>
+      <p:sp>
+        <p:nvSpPr>
+          <p:cNvPr id="5" name="Date Placeholder 4"/>
+          <p:cNvSpPr>
+            <a:spLocks noGrp="1"/>
+          </p:cNvSpPr>
+          <p:nvPr>
+            <p:ph type="dt" idx="1"/>
+          </p:nvPr>
+        </p:nvSpPr>
+        <p:spPr/>
+        <p:txBody>
+          <a:bodyPr/>
+          <a:lstStyle/>
+          <a:p>
+            <a:fld id="{E52F4C69-7549-4A71-BB0C-341D25F594E8}" type="datetime1">
+              <a:rPr lang="de-AT" smtClean="0"/>
+              <a:t>08.09.20</a:t>
+            </a:fld>
+            <a:endParaRPr lang="de-AT"/>
+          </a:p>
+        </p:txBody>
+      </p:sp>
+      <p:sp>
+        <p:nvSpPr>
+          <p:cNvPr id="6" name="Slide Number Placeholder 5"/>
+          <p:cNvSpPr>
+            <a:spLocks noGrp="1"/>
+          </p:cNvSpPr>
+          <p:nvPr>
+            <p:ph type="sldNum" sz="quarter" idx="5"/>
+          </p:nvPr>
+        </p:nvSpPr>
+        <p:spPr/>
+        <p:txBody>
+          <a:bodyPr/>
+          <a:lstStyle/>
+          <a:p>
+            <a:fld id="{37D9B929-EEB3-453F-899C-B5737EAC3251}" type="slidenum">
+              <a:rPr lang="de-AT" smtClean="0"/>
               <a:t>18</a:t>
             </a:fld>
             <a:endParaRPr lang="de-AT"/>
@@ -4664,6 +5008,314 @@
     <p:extLst>
       <p:ext uri="{BB962C8B-B14F-4D97-AF65-F5344CB8AC3E}">
         <p14:creationId xmlns:p14="http://schemas.microsoft.com/office/powerpoint/2010/main" val="988095609"/>
+      </p:ext>
+    </p:extLst>
+  </p:cSld>
+  <p:clrMapOvr>
+    <a:masterClrMapping/>
+  </p:clrMapOvr>
+</p:notes>
+</file>
+
+<file path=ppt/notesSlides/notesSlide14.xml><?xml version="1.0" encoding="utf-8"?>
+<p:notes xmlns:a="http://schemas.openxmlformats.org/drawingml/2006/main" xmlns:r="http://schemas.openxmlformats.org/officeDocument/2006/relationships" xmlns:p="http://schemas.openxmlformats.org/presentationml/2006/main">
+  <p:cSld>
+    <p:spTree>
+      <p:nvGrpSpPr>
+        <p:cNvPr id="1" name=""/>
+        <p:cNvGrpSpPr/>
+        <p:nvPr/>
+      </p:nvGrpSpPr>
+      <p:grpSpPr>
+        <a:xfrm>
+          <a:off x="0" y="0"/>
+          <a:ext cx="0" cy="0"/>
+          <a:chOff x="0" y="0"/>
+          <a:chExt cx="0" cy="0"/>
+        </a:xfrm>
+      </p:grpSpPr>
+      <p:sp>
+        <p:nvSpPr>
+          <p:cNvPr id="2" name="Slide Image Placeholder 1"/>
+          <p:cNvSpPr>
+            <a:spLocks noGrp="1" noRot="1" noChangeAspect="1"/>
+          </p:cNvSpPr>
+          <p:nvPr>
+            <p:ph type="sldImg"/>
+          </p:nvPr>
+        </p:nvSpPr>
+        <p:spPr/>
+      </p:sp>
+      <p:sp>
+        <p:nvSpPr>
+          <p:cNvPr id="3" name="Notes Placeholder 2"/>
+          <p:cNvSpPr>
+            <a:spLocks noGrp="1"/>
+          </p:cNvSpPr>
+          <p:nvPr>
+            <p:ph type="body" idx="1"/>
+          </p:nvPr>
+        </p:nvSpPr>
+        <p:spPr/>
+        <p:txBody>
+          <a:bodyPr/>
+          <a:lstStyle/>
+          <a:p>
+            <a:r>
+              <a:rPr lang="de-DE" dirty="0"/>
+              <a:t>https://</a:t>
+            </a:r>
+            <a:r>
+              <a:rPr lang="de-DE" dirty="0" err="1"/>
+              <a:t>docs.fiskaltrust.cloud</a:t>
+            </a:r>
+            <a:r>
+              <a:rPr lang="de-DE" dirty="0"/>
+              <a:t>/</a:t>
+            </a:r>
+            <a:r>
+              <a:rPr lang="de-DE" dirty="0" err="1"/>
+              <a:t>doc</a:t>
+            </a:r>
+            <a:r>
+              <a:rPr lang="de-DE" dirty="0"/>
+              <a:t>/</a:t>
+            </a:r>
+            <a:r>
+              <a:rPr lang="de-DE" dirty="0" err="1"/>
+              <a:t>productdescription</a:t>
+            </a:r>
+            <a:r>
+              <a:rPr lang="de-DE" dirty="0"/>
+              <a:t>-de-</a:t>
+            </a:r>
+            <a:r>
+              <a:rPr lang="de-DE" dirty="0" err="1"/>
+              <a:t>doc</a:t>
+            </a:r>
+            <a:r>
+              <a:rPr lang="de-DE" dirty="0"/>
+              <a:t>/</a:t>
+            </a:r>
+            <a:r>
+              <a:rPr lang="de-DE" dirty="0" err="1"/>
+              <a:t>for-posdealers</a:t>
+            </a:r>
+            <a:r>
+              <a:rPr lang="de-DE" dirty="0"/>
+              <a:t>/02-pre-sales/rollout-</a:t>
+            </a:r>
+            <a:r>
+              <a:rPr lang="de-DE" dirty="0" err="1"/>
+              <a:t>scenarios.html</a:t>
+            </a:r>
+            <a:endParaRPr lang="de-DE" dirty="0"/>
+          </a:p>
+        </p:txBody>
+      </p:sp>
+      <p:sp>
+        <p:nvSpPr>
+          <p:cNvPr id="4" name="Header Placeholder 3"/>
+          <p:cNvSpPr>
+            <a:spLocks noGrp="1"/>
+          </p:cNvSpPr>
+          <p:nvPr>
+            <p:ph type="hdr" sz="quarter"/>
+          </p:nvPr>
+        </p:nvSpPr>
+        <p:spPr/>
+        <p:txBody>
+          <a:bodyPr/>
+          <a:lstStyle/>
+          <a:p>
+            <a:r>
+              <a:rPr lang="de-AT"/>
+              <a:t>fiskaltrust. consulting gmbh - confidential</a:t>
+            </a:r>
+            <a:endParaRPr lang="de-AT" dirty="0"/>
+          </a:p>
+        </p:txBody>
+      </p:sp>
+      <p:sp>
+        <p:nvSpPr>
+          <p:cNvPr id="5" name="Date Placeholder 4"/>
+          <p:cNvSpPr>
+            <a:spLocks noGrp="1"/>
+          </p:cNvSpPr>
+          <p:nvPr>
+            <p:ph type="dt" idx="1"/>
+          </p:nvPr>
+        </p:nvSpPr>
+        <p:spPr/>
+        <p:txBody>
+          <a:bodyPr/>
+          <a:lstStyle/>
+          <a:p>
+            <a:fld id="{E52F4C69-7549-4A71-BB0C-341D25F594E8}" type="datetime1">
+              <a:rPr lang="de-AT" smtClean="0"/>
+              <a:t>08.09.20</a:t>
+            </a:fld>
+            <a:endParaRPr lang="de-AT"/>
+          </a:p>
+        </p:txBody>
+      </p:sp>
+      <p:sp>
+        <p:nvSpPr>
+          <p:cNvPr id="6" name="Slide Number Placeholder 5"/>
+          <p:cNvSpPr>
+            <a:spLocks noGrp="1"/>
+          </p:cNvSpPr>
+          <p:nvPr>
+            <p:ph type="sldNum" sz="quarter" idx="5"/>
+          </p:nvPr>
+        </p:nvSpPr>
+        <p:spPr/>
+        <p:txBody>
+          <a:bodyPr/>
+          <a:lstStyle/>
+          <a:p>
+            <a:fld id="{37D9B929-EEB3-453F-899C-B5737EAC3251}" type="slidenum">
+              <a:rPr lang="de-AT" smtClean="0"/>
+              <a:t>21</a:t>
+            </a:fld>
+            <a:endParaRPr lang="de-AT"/>
+          </a:p>
+        </p:txBody>
+      </p:sp>
+    </p:spTree>
+    <p:extLst>
+      <p:ext uri="{BB962C8B-B14F-4D97-AF65-F5344CB8AC3E}">
+        <p14:creationId xmlns:p14="http://schemas.microsoft.com/office/powerpoint/2010/main" val="307574156"/>
+      </p:ext>
+    </p:extLst>
+  </p:cSld>
+  <p:clrMapOvr>
+    <a:masterClrMapping/>
+  </p:clrMapOvr>
+</p:notes>
+</file>
+
+<file path=ppt/notesSlides/notesSlide15.xml><?xml version="1.0" encoding="utf-8"?>
+<p:notes xmlns:a="http://schemas.openxmlformats.org/drawingml/2006/main" xmlns:r="http://schemas.openxmlformats.org/officeDocument/2006/relationships" xmlns:p="http://schemas.openxmlformats.org/presentationml/2006/main">
+  <p:cSld>
+    <p:spTree>
+      <p:nvGrpSpPr>
+        <p:cNvPr id="1" name=""/>
+        <p:cNvGrpSpPr/>
+        <p:nvPr/>
+      </p:nvGrpSpPr>
+      <p:grpSpPr>
+        <a:xfrm>
+          <a:off x="0" y="0"/>
+          <a:ext cx="0" cy="0"/>
+          <a:chOff x="0" y="0"/>
+          <a:chExt cx="0" cy="0"/>
+        </a:xfrm>
+      </p:grpSpPr>
+      <p:sp>
+        <p:nvSpPr>
+          <p:cNvPr id="2" name="Slide Image Placeholder 1"/>
+          <p:cNvSpPr>
+            <a:spLocks noGrp="1" noRot="1" noChangeAspect="1"/>
+          </p:cNvSpPr>
+          <p:nvPr>
+            <p:ph type="sldImg"/>
+          </p:nvPr>
+        </p:nvSpPr>
+        <p:spPr/>
+      </p:sp>
+      <p:sp>
+        <p:nvSpPr>
+          <p:cNvPr id="3" name="Notes Placeholder 2"/>
+          <p:cNvSpPr>
+            <a:spLocks noGrp="1"/>
+          </p:cNvSpPr>
+          <p:nvPr>
+            <p:ph type="body" idx="1"/>
+          </p:nvPr>
+        </p:nvSpPr>
+        <p:spPr/>
+        <p:txBody>
+          <a:bodyPr/>
+          <a:lstStyle/>
+          <a:p>
+            <a:endParaRPr lang="de-DE" dirty="0"/>
+          </a:p>
+        </p:txBody>
+      </p:sp>
+      <p:sp>
+        <p:nvSpPr>
+          <p:cNvPr id="4" name="Header Placeholder 3"/>
+          <p:cNvSpPr>
+            <a:spLocks noGrp="1"/>
+          </p:cNvSpPr>
+          <p:nvPr>
+            <p:ph type="hdr" sz="quarter"/>
+          </p:nvPr>
+        </p:nvSpPr>
+        <p:spPr/>
+        <p:txBody>
+          <a:bodyPr/>
+          <a:lstStyle/>
+          <a:p>
+            <a:r>
+              <a:rPr lang="de-AT"/>
+              <a:t>fiskaltrust. consulting gmbh - confidential</a:t>
+            </a:r>
+            <a:endParaRPr lang="de-AT" dirty="0"/>
+          </a:p>
+        </p:txBody>
+      </p:sp>
+      <p:sp>
+        <p:nvSpPr>
+          <p:cNvPr id="5" name="Date Placeholder 4"/>
+          <p:cNvSpPr>
+            <a:spLocks noGrp="1"/>
+          </p:cNvSpPr>
+          <p:nvPr>
+            <p:ph type="dt" idx="1"/>
+          </p:nvPr>
+        </p:nvSpPr>
+        <p:spPr/>
+        <p:txBody>
+          <a:bodyPr/>
+          <a:lstStyle/>
+          <a:p>
+            <a:fld id="{E52F4C69-7549-4A71-BB0C-341D25F594E8}" type="datetime1">
+              <a:rPr lang="de-AT" smtClean="0"/>
+              <a:t>08.09.20</a:t>
+            </a:fld>
+            <a:endParaRPr lang="de-AT"/>
+          </a:p>
+        </p:txBody>
+      </p:sp>
+      <p:sp>
+        <p:nvSpPr>
+          <p:cNvPr id="6" name="Slide Number Placeholder 5"/>
+          <p:cNvSpPr>
+            <a:spLocks noGrp="1"/>
+          </p:cNvSpPr>
+          <p:nvPr>
+            <p:ph type="sldNum" sz="quarter" idx="5"/>
+          </p:nvPr>
+        </p:nvSpPr>
+        <p:spPr/>
+        <p:txBody>
+          <a:bodyPr/>
+          <a:lstStyle/>
+          <a:p>
+            <a:fld id="{37D9B929-EEB3-453F-899C-B5737EAC3251}" type="slidenum">
+              <a:rPr lang="de-AT" smtClean="0"/>
+              <a:t>22</a:t>
+            </a:fld>
+            <a:endParaRPr lang="de-AT"/>
+          </a:p>
+        </p:txBody>
+      </p:sp>
+    </p:spTree>
+    <p:extLst>
+      <p:ext uri="{BB962C8B-B14F-4D97-AF65-F5344CB8AC3E}">
+        <p14:creationId xmlns:p14="http://schemas.microsoft.com/office/powerpoint/2010/main" val="899144978"/>
       </p:ext>
     </p:extLst>
   </p:cSld>
@@ -4734,7 +5386,65 @@
               <a:tabLst/>
               <a:defRPr/>
             </a:pPr>
-            <a:endParaRPr lang="de-DE" sz="1100" dirty="0"/>
+            <a:r>
+              <a:rPr lang="de-DE" sz="1100" dirty="0"/>
+              <a:t>Das fiskaltrust Portal wird als Rollout Management Tool verwendet. Es unterstützt Kassenhändler bei der Vorbereitung und Ausführung des Rollout.</a:t>
+            </a:r>
+          </a:p>
+          <a:p>
+            <a:r>
+              <a:rPr lang="de-DE" sz="1100" b="1" dirty="0"/>
+              <a:t>Live und Sandbox Portal</a:t>
+            </a:r>
+            <a:r>
+              <a:rPr lang="de-DE" sz="1100" dirty="0"/>
+              <a:t>: fiskaltrust stellt neben der Live-Umgebung auch eine Testumgebung namens Sandbox zur Verfügung</a:t>
+            </a:r>
+          </a:p>
+          <a:p>
+            <a:r>
+              <a:rPr lang="de-DE" sz="1100" dirty="0"/>
+              <a:t>(https://</a:t>
+            </a:r>
+            <a:r>
+              <a:rPr lang="de-DE" sz="1100" dirty="0" err="1"/>
+              <a:t>portal.fiskaltrust.de</a:t>
+            </a:r>
+            <a:r>
+              <a:rPr lang="de-DE" sz="1100" dirty="0"/>
+              <a:t> und https://portal-</a:t>
+            </a:r>
+            <a:r>
+              <a:rPr lang="de-DE" sz="1100" dirty="0" err="1"/>
+              <a:t>sandbox.fiskaltrust.de</a:t>
+            </a:r>
+            <a:r>
+              <a:rPr lang="de-DE" sz="1100" dirty="0"/>
+              <a:t>)</a:t>
+            </a:r>
+          </a:p>
+          <a:p>
+            <a:pPr marL="0" marR="0" lvl="0" indent="0" algn="l" defTabSz="914400" rtl="0" eaLnBrk="1" fontAlgn="auto" latinLnBrk="0" hangingPunct="1">
+              <a:lnSpc>
+                <a:spcPct val="100000"/>
+              </a:lnSpc>
+              <a:spcBef>
+                <a:spcPts val="0"/>
+              </a:spcBef>
+              <a:spcAft>
+                <a:spcPts val="0"/>
+              </a:spcAft>
+              <a:buClrTx/>
+              <a:buSzTx/>
+              <a:buFontTx/>
+              <a:buNone/>
+              <a:tabLst/>
+              <a:defRPr/>
+            </a:pPr>
+            <a:r>
+              <a:rPr lang="de-DE" sz="1100" dirty="0"/>
+              <a:t>Im Portal kann die Einladung der Kassenbetreiber die Vorbereitung der Konfiguration und der Download des Launcher erfolgen. Im Folgenden gehen wir auf die Details hierzu ein.</a:t>
+            </a:r>
           </a:p>
           <a:p>
             <a:endParaRPr lang="de-DE" sz="1100" dirty="0"/>
@@ -4816,7 +5526,7 @@
           <a:p>
             <a:fld id="{37D9B929-EEB3-453F-899C-B5737EAC3251}" type="slidenum">
               <a:rPr lang="de-AT" smtClean="0"/>
-              <a:t>4</a:t>
+              <a:t>3</a:t>
             </a:fld>
             <a:endParaRPr lang="de-AT"/>
           </a:p>
@@ -4825,7 +5535,7 @@
     </p:spTree>
     <p:extLst>
       <p:ext uri="{BB962C8B-B14F-4D97-AF65-F5344CB8AC3E}">
-        <p14:creationId xmlns:p14="http://schemas.microsoft.com/office/powerpoint/2010/main" val="71780586"/>
+        <p14:creationId xmlns:p14="http://schemas.microsoft.com/office/powerpoint/2010/main" val="1532984696"/>
       </p:ext>
     </p:extLst>
   </p:cSld>
@@ -4879,6 +5589,140 @@
           <a:bodyPr/>
           <a:lstStyle/>
           <a:p>
+            <a:pPr marL="0" marR="0" lvl="0" indent="0" algn="l" defTabSz="914400" rtl="0" eaLnBrk="1" fontAlgn="auto" latinLnBrk="0" hangingPunct="1">
+              <a:lnSpc>
+                <a:spcPct val="100000"/>
+              </a:lnSpc>
+              <a:spcBef>
+                <a:spcPts val="0"/>
+              </a:spcBef>
+              <a:spcAft>
+                <a:spcPts val="0"/>
+              </a:spcAft>
+              <a:buClrTx/>
+              <a:buSzTx/>
+              <a:buFontTx/>
+              <a:buNone/>
+              <a:tabLst/>
+              <a:defRPr/>
+            </a:pPr>
+            <a:r>
+              <a:rPr lang="de-DE" sz="1100" dirty="0"/>
+              <a:t>Kassenbetreiber können manuell oder automatisiert über das Portal eingeladen werden. Zum automatisierten Einladen vieler Kassenbetreiber wird eine CSV Datei verwendet, die zu diesem Zweck im Portal importiert wird. </a:t>
+            </a:r>
+          </a:p>
+          <a:p>
+            <a:pPr marL="0" marR="0" lvl="0" indent="0" algn="l" defTabSz="914400" rtl="0" eaLnBrk="1" fontAlgn="auto" latinLnBrk="0" hangingPunct="1">
+              <a:lnSpc>
+                <a:spcPct val="100000"/>
+              </a:lnSpc>
+              <a:spcBef>
+                <a:spcPts val="0"/>
+              </a:spcBef>
+              <a:spcAft>
+                <a:spcPts val="0"/>
+              </a:spcAft>
+              <a:buClrTx/>
+              <a:buSzTx/>
+              <a:buFontTx/>
+              <a:buNone/>
+              <a:tabLst/>
+              <a:defRPr/>
+            </a:pPr>
+            <a:r>
+              <a:rPr lang="de-DE" sz="1100" dirty="0"/>
+              <a:t>Sobald die Einladung abgesetzt wurde, wird eine Einladungs-Email an den Kassenbetreiber gesendet. </a:t>
+            </a:r>
+          </a:p>
+          <a:p>
+            <a:pPr marL="0" marR="0" lvl="0" indent="0" algn="l" defTabSz="914400" rtl="0" eaLnBrk="1" fontAlgn="auto" latinLnBrk="0" hangingPunct="1">
+              <a:lnSpc>
+                <a:spcPct val="100000"/>
+              </a:lnSpc>
+              <a:spcBef>
+                <a:spcPts val="0"/>
+              </a:spcBef>
+              <a:spcAft>
+                <a:spcPts val="0"/>
+              </a:spcAft>
+              <a:buClrTx/>
+              <a:buSzTx/>
+              <a:buFontTx/>
+              <a:buNone/>
+              <a:tabLst/>
+              <a:defRPr/>
+            </a:pPr>
+            <a:r>
+              <a:rPr lang="de-DE" sz="1100" dirty="0"/>
+              <a:t>Dieser erhält daraufhin die Email mit Informationen und einem Email-Bestätigungs-Link.</a:t>
+            </a:r>
+          </a:p>
+          <a:p>
+            <a:pPr marL="0" marR="0" lvl="0" indent="0" algn="l" defTabSz="914400" rtl="0" eaLnBrk="1" fontAlgn="auto" latinLnBrk="0" hangingPunct="1">
+              <a:lnSpc>
+                <a:spcPct val="100000"/>
+              </a:lnSpc>
+              <a:spcBef>
+                <a:spcPts val="0"/>
+              </a:spcBef>
+              <a:spcAft>
+                <a:spcPts val="0"/>
+              </a:spcAft>
+              <a:buClrTx/>
+              <a:buSzTx/>
+              <a:buFontTx/>
+              <a:buNone/>
+              <a:tabLst/>
+              <a:defRPr/>
+            </a:pPr>
+            <a:r>
+              <a:rPr lang="de-DE" sz="1100" dirty="0"/>
+              <a:t>Der Betreiber drückt den Link und wird auf das fiskaltrust Portal weiter geleitet wo er seine Daten überprüfen und sein Passwort setzen kann. Im nächsten Schritt muss er den Kooperationsvertrag mit fiskaltrust digital unterzeichnen. </a:t>
+            </a:r>
+          </a:p>
+          <a:p>
+            <a:pPr marL="0" marR="0" lvl="0" indent="0" algn="l" defTabSz="914400" rtl="0" eaLnBrk="1" fontAlgn="auto" latinLnBrk="0" hangingPunct="1">
+              <a:lnSpc>
+                <a:spcPct val="100000"/>
+              </a:lnSpc>
+              <a:spcBef>
+                <a:spcPts val="0"/>
+              </a:spcBef>
+              <a:spcAft>
+                <a:spcPts val="0"/>
+              </a:spcAft>
+              <a:buClrTx/>
+              <a:buSzTx/>
+              <a:buFontTx/>
+              <a:buNone/>
+              <a:tabLst/>
+              <a:defRPr/>
+            </a:pPr>
+            <a:r>
+              <a:rPr lang="de-DE" sz="1100" dirty="0"/>
+              <a:t>Der Händler Zugriffsrechte für die sogenannte Surrogation Funktion anfordern. Damit kann der Händler später mit der </a:t>
+            </a:r>
+            <a:r>
+              <a:rPr lang="de-DE" sz="1100" dirty="0" err="1"/>
+              <a:t>AccountID</a:t>
+            </a:r>
+            <a:r>
+              <a:rPr lang="de-DE" sz="1100" dirty="0"/>
+              <a:t> des Betreibers in dessen Portal-Account </a:t>
+            </a:r>
+            <a:r>
+              <a:rPr lang="de-DE" sz="1100" dirty="0" err="1"/>
+              <a:t>switchen</a:t>
+            </a:r>
+            <a:r>
+              <a:rPr lang="de-DE" sz="1100" dirty="0"/>
+              <a:t> und im Namen des Betreibers Produkte auschecken und notwendige Konfigurationen vornehmen.</a:t>
+            </a:r>
+          </a:p>
+          <a:p>
+            <a:endParaRPr lang="de-DE" sz="1100" dirty="0"/>
+          </a:p>
+          <a:p>
             <a:endParaRPr lang="de-DE" sz="1100" dirty="0"/>
           </a:p>
         </p:txBody>
@@ -4946,7 +5790,7 @@
           <a:p>
             <a:fld id="{37D9B929-EEB3-453F-899C-B5737EAC3251}" type="slidenum">
               <a:rPr lang="de-AT" smtClean="0"/>
-              <a:t>5</a:t>
+              <a:t>4</a:t>
             </a:fld>
             <a:endParaRPr lang="de-AT"/>
           </a:p>
@@ -4955,7 +5799,7 @@
     </p:spTree>
     <p:extLst>
       <p:ext uri="{BB962C8B-B14F-4D97-AF65-F5344CB8AC3E}">
-        <p14:creationId xmlns:p14="http://schemas.microsoft.com/office/powerpoint/2010/main" val="862512987"/>
+        <p14:creationId xmlns:p14="http://schemas.microsoft.com/office/powerpoint/2010/main" val="71780586"/>
       </p:ext>
     </p:extLst>
   </p:cSld>
@@ -5010,62 +5854,170 @@
           <a:lstStyle/>
           <a:p>
             <a:r>
-              <a:rPr lang="de-DE" dirty="0"/>
-              <a:t>Siehe: https://</a:t>
-            </a:r>
-            <a:r>
-              <a:rPr lang="de-DE" dirty="0" err="1"/>
-              <a:t>github.com</a:t>
-            </a:r>
-            <a:r>
-              <a:rPr lang="de-DE" dirty="0"/>
-              <a:t>/fiskaltrust/</a:t>
-            </a:r>
-            <a:r>
-              <a:rPr lang="de-DE" dirty="0" err="1"/>
-              <a:t>productdescription</a:t>
-            </a:r>
-            <a:r>
-              <a:rPr lang="de-DE" dirty="0"/>
-              <a:t>-de-</a:t>
-            </a:r>
-            <a:r>
-              <a:rPr lang="de-DE" dirty="0" err="1"/>
-              <a:t>doc</a:t>
-            </a:r>
-            <a:r>
-              <a:rPr lang="de-DE" dirty="0"/>
-              <a:t>/</a:t>
-            </a:r>
-            <a:r>
-              <a:rPr lang="de-DE" dirty="0" err="1"/>
-              <a:t>blob</a:t>
-            </a:r>
-            <a:r>
-              <a:rPr lang="de-DE" dirty="0"/>
-              <a:t>/</a:t>
-            </a:r>
-            <a:r>
-              <a:rPr lang="de-DE" dirty="0" err="1"/>
-              <a:t>master</a:t>
-            </a:r>
-            <a:r>
-              <a:rPr lang="de-DE" dirty="0"/>
-              <a:t>/</a:t>
-            </a:r>
-            <a:r>
-              <a:rPr lang="de-DE" dirty="0" err="1"/>
-              <a:t>for-posdealers</a:t>
-            </a:r>
-            <a:r>
-              <a:rPr lang="de-DE" dirty="0"/>
-              <a:t>/02-pre-sales/automatisierter-</a:t>
-            </a:r>
-            <a:r>
-              <a:rPr lang="de-DE" dirty="0" err="1"/>
-              <a:t>rollout.md</a:t>
-            </a:r>
-            <a:endParaRPr lang="de-DE" dirty="0"/>
+              <a:rPr lang="de-DE" sz="1100" noProof="0" dirty="0"/>
+              <a:t>Die Konfiguration einer ft.Middleware Instanz wird über eine sogenannte Cashbox im Portal vorgenommen.</a:t>
+            </a:r>
+          </a:p>
+          <a:p>
+            <a:endParaRPr lang="de-DE" sz="1100" noProof="0" dirty="0"/>
+          </a:p>
+          <a:p>
+            <a:r>
+              <a:rPr lang="de-DE" sz="1100" b="0" i="0" kern="1200" dirty="0">
+                <a:solidFill>
+                  <a:schemeClr val="tx1"/>
+                </a:solidFill>
+                <a:effectLst/>
+                <a:latin typeface="+mn-lt"/>
+                <a:ea typeface="+mn-ea"/>
+                <a:cs typeface="+mn-cs"/>
+              </a:rPr>
+              <a:t>Die Cashbox ist ein Konfigurationscontainer, der die Konfiguration der einzelnen Komponenten der ft.Middleware beinhaltet. Über die Cashbox können die Konfigurationen miteinander verbunden werden. So kann die Cashbox die Konfiguration von Queue, SCU und von diversen Helper beinhalten und diese miteinander verbinden. </a:t>
+            </a:r>
+          </a:p>
+          <a:p>
+            <a:endParaRPr lang="de-DE" sz="1100" b="0" i="0" kern="1200" noProof="0" dirty="0">
+              <a:solidFill>
+                <a:schemeClr val="tx1"/>
+              </a:solidFill>
+              <a:effectLst/>
+              <a:latin typeface="+mn-lt"/>
+              <a:ea typeface="+mn-ea"/>
+              <a:cs typeface="+mn-cs"/>
+            </a:endParaRPr>
+          </a:p>
+          <a:p>
+            <a:pPr marL="0" marR="0" lvl="0" indent="0" algn="l" defTabSz="914400" rtl="0" eaLnBrk="1" fontAlgn="auto" latinLnBrk="0" hangingPunct="1">
+              <a:lnSpc>
+                <a:spcPct val="100000"/>
+              </a:lnSpc>
+              <a:spcBef>
+                <a:spcPts val="0"/>
+              </a:spcBef>
+              <a:spcAft>
+                <a:spcPts val="0"/>
+              </a:spcAft>
+              <a:buClrTx/>
+              <a:buSzTx/>
+              <a:buFontTx/>
+              <a:buNone/>
+              <a:tabLst/>
+              <a:defRPr/>
+            </a:pPr>
+            <a:r>
+              <a:rPr lang="de-DE" sz="1100" b="0" i="0" kern="1200" dirty="0">
+                <a:solidFill>
+                  <a:schemeClr val="tx1"/>
+                </a:solidFill>
+                <a:effectLst/>
+                <a:latin typeface="+mn-lt"/>
+                <a:ea typeface="+mn-ea"/>
+                <a:cs typeface="+mn-cs"/>
+              </a:rPr>
+              <a:t>Die Queue ist eine Komponente der ft.Middleware, sammelt die Belege und ist für das Erzeugen und Persistieren der Belegkette verantwortlich. Des Weiteren ist die Queue die Komponente der ft.Middleware mit der Ihr  POS System kommuniziert. An sie sendet das POS System die Belegdaten und erhält Signaturen und andere Daten zurück.</a:t>
+            </a:r>
+          </a:p>
+          <a:p>
+            <a:endParaRPr lang="de-DE" sz="1100" b="0" i="0" kern="1200" noProof="0" dirty="0">
+              <a:solidFill>
+                <a:schemeClr val="tx1"/>
+              </a:solidFill>
+              <a:effectLst/>
+              <a:latin typeface="+mn-lt"/>
+              <a:ea typeface="+mn-ea"/>
+              <a:cs typeface="+mn-cs"/>
+            </a:endParaRPr>
+          </a:p>
+          <a:p>
+            <a:r>
+              <a:rPr lang="de-DE" sz="1100" b="0" i="0" kern="1200" dirty="0">
+                <a:solidFill>
+                  <a:schemeClr val="tx1"/>
+                </a:solidFill>
+                <a:effectLst/>
+                <a:latin typeface="+mn-lt"/>
+                <a:ea typeface="+mn-ea"/>
+                <a:cs typeface="+mn-cs"/>
+              </a:rPr>
+              <a:t>Die SCU (Security </a:t>
+            </a:r>
+            <a:r>
+              <a:rPr lang="de-DE" sz="1100" b="0" i="0" kern="1200" dirty="0" err="1">
+                <a:solidFill>
+                  <a:schemeClr val="tx1"/>
+                </a:solidFill>
+                <a:effectLst/>
+                <a:latin typeface="+mn-lt"/>
+                <a:ea typeface="+mn-ea"/>
+                <a:cs typeface="+mn-cs"/>
+              </a:rPr>
+              <a:t>Creation</a:t>
+            </a:r>
+            <a:r>
+              <a:rPr lang="de-DE" sz="1100" b="0" i="0" kern="1200" dirty="0">
+                <a:solidFill>
+                  <a:schemeClr val="tx1"/>
+                </a:solidFill>
+                <a:effectLst/>
+                <a:latin typeface="+mn-lt"/>
+                <a:ea typeface="+mn-ea"/>
+                <a:cs typeface="+mn-cs"/>
+              </a:rPr>
+              <a:t> Unit, deutsch: Signatur-Erstellungs-Einheit) ist eine Komponente der </a:t>
+            </a:r>
+            <a:r>
+              <a:rPr lang="de-DE" sz="1100" b="0" i="0" kern="1200" dirty="0" err="1">
+                <a:solidFill>
+                  <a:schemeClr val="tx1"/>
+                </a:solidFill>
+                <a:effectLst/>
+                <a:latin typeface="+mn-lt"/>
+                <a:ea typeface="+mn-ea"/>
+                <a:cs typeface="+mn-cs"/>
+              </a:rPr>
+              <a:t>ft.Middelware</a:t>
+            </a:r>
+            <a:r>
+              <a:rPr lang="de-DE" sz="1100" b="0" i="0" kern="1200" dirty="0">
+                <a:solidFill>
+                  <a:schemeClr val="tx1"/>
+                </a:solidFill>
+                <a:effectLst/>
+                <a:latin typeface="+mn-lt"/>
+                <a:ea typeface="+mn-ea"/>
+                <a:cs typeface="+mn-cs"/>
+              </a:rPr>
+              <a:t>, die für die Signierung zuständig ist. In Deutschland übernimmt sie die Kommunikation mit der TSE, die schlussendlich die Signierung vornimmt. Je nachdem welche TSE Sie benutzen möchten, benötigt die SCU eine entsprechende Konfiguration um auf diese zugreifen zu können.</a:t>
+            </a:r>
+          </a:p>
+          <a:p>
+            <a:endParaRPr lang="de-DE" sz="1100" b="0" i="0" kern="1200" noProof="0" dirty="0">
+              <a:solidFill>
+                <a:schemeClr val="tx1"/>
+              </a:solidFill>
+              <a:effectLst/>
+              <a:latin typeface="+mn-lt"/>
+              <a:ea typeface="+mn-ea"/>
+              <a:cs typeface="+mn-cs"/>
+            </a:endParaRPr>
+          </a:p>
+          <a:p>
+            <a:r>
+              <a:rPr lang="de-DE" sz="1100" b="0" i="0" kern="1200" noProof="0" dirty="0">
+                <a:solidFill>
+                  <a:schemeClr val="tx1"/>
+                </a:solidFill>
+                <a:effectLst/>
+                <a:latin typeface="+mn-lt"/>
+                <a:ea typeface="+mn-ea"/>
+                <a:cs typeface="+mn-cs"/>
+              </a:rPr>
+              <a:t>Die Cashbox beinhaltet die benötigten Konfigurationen und verbindet diese miteinander. Jede Middleware Instanz benötigt eine Cashbox um den Betrieb aufnehmen zu können.</a:t>
+            </a:r>
+            <a:endParaRPr lang="de-DE" sz="1100" noProof="0" dirty="0"/>
+          </a:p>
+          <a:p>
+            <a:endParaRPr lang="de-DE" sz="1100" dirty="0"/>
           </a:p>
         </p:txBody>
       </p:sp>
@@ -5132,7 +6084,7 @@
           <a:p>
             <a:fld id="{37D9B929-EEB3-453F-899C-B5737EAC3251}" type="slidenum">
               <a:rPr lang="de-AT" smtClean="0"/>
-              <a:t>8</a:t>
+              <a:t>5</a:t>
             </a:fld>
             <a:endParaRPr lang="de-AT"/>
           </a:p>
@@ -5141,7 +6093,7 @@
     </p:spTree>
     <p:extLst>
       <p:ext uri="{BB962C8B-B14F-4D97-AF65-F5344CB8AC3E}">
-        <p14:creationId xmlns:p14="http://schemas.microsoft.com/office/powerpoint/2010/main" val="3975435480"/>
+        <p14:creationId xmlns:p14="http://schemas.microsoft.com/office/powerpoint/2010/main" val="862512987"/>
       </p:ext>
     </p:extLst>
   </p:cSld>
@@ -5195,7 +6147,10 @@
           <a:bodyPr/>
           <a:lstStyle/>
           <a:p>
-            <a:endParaRPr lang="de-DE" dirty="0"/>
+            <a:r>
+              <a:rPr lang="de-DE" dirty="0"/>
+              <a:t>Diese Schritte sind bei einem manuellen Anlegen über das Portal vorzunehmen um eine Cashbox zusammen zu stellen.</a:t>
+            </a:r>
           </a:p>
         </p:txBody>
       </p:sp>
@@ -5262,7 +6217,7 @@
           <a:p>
             <a:fld id="{37D9B929-EEB3-453F-899C-B5737EAC3251}" type="slidenum">
               <a:rPr lang="de-AT" smtClean="0"/>
-              <a:t>9</a:t>
+              <a:t>6</a:t>
             </a:fld>
             <a:endParaRPr lang="de-AT"/>
           </a:p>
@@ -5271,7 +6226,7 @@
     </p:spTree>
     <p:extLst>
       <p:ext uri="{BB962C8B-B14F-4D97-AF65-F5344CB8AC3E}">
-        <p14:creationId xmlns:p14="http://schemas.microsoft.com/office/powerpoint/2010/main" val="1809690114"/>
+        <p14:creationId xmlns:p14="http://schemas.microsoft.com/office/powerpoint/2010/main" val="3631936171"/>
       </p:ext>
     </p:extLst>
   </p:cSld>
@@ -5325,6 +6280,251 @@
           <a:bodyPr/>
           <a:lstStyle/>
           <a:p>
+            <a:r>
+              <a:rPr lang="de-DE" dirty="0"/>
+              <a:t>Die fiskaltrust.Middleware wird mit Hilfe eines Launcher gestartet. </a:t>
+            </a:r>
+          </a:p>
+          <a:p>
+            <a:endParaRPr lang="de-DE" dirty="0"/>
+          </a:p>
+          <a:p>
+            <a:r>
+              <a:rPr lang="de-DE" dirty="0"/>
+              <a:t>Es gibt 2 Arten von Launcher: </a:t>
+            </a:r>
+          </a:p>
+          <a:p>
+            <a:pPr marL="228600" indent="-228600">
+              <a:buAutoNum type="arabicPeriod"/>
+            </a:pPr>
+            <a:r>
+              <a:rPr lang="de-DE" dirty="0"/>
+              <a:t>Online Launcher: -&gt; Lädt beim Start je nach Konfiguration die benötigten Pakete aus der Cloud.</a:t>
+            </a:r>
+          </a:p>
+          <a:p>
+            <a:pPr marL="228600" indent="-228600">
+              <a:buAutoNum type="arabicPeriod"/>
+            </a:pPr>
+            <a:r>
+              <a:rPr lang="de-DE" dirty="0"/>
+              <a:t>Offline Launcher: -&gt; Beinhaltet bereits alle notwendigen Pakete ist jedoch viel umfangreicher.</a:t>
+            </a:r>
+          </a:p>
+          <a:p>
+            <a:pPr marL="228600" indent="-228600">
+              <a:buAutoNum type="arabicPeriod"/>
+            </a:pPr>
+            <a:endParaRPr lang="de-DE" dirty="0"/>
+          </a:p>
+          <a:p>
+            <a:pPr marL="0" marR="0" lvl="0" indent="0" algn="l" defTabSz="914400" rtl="0" eaLnBrk="1" fontAlgn="auto" latinLnBrk="0" hangingPunct="1">
+              <a:lnSpc>
+                <a:spcPct val="100000"/>
+              </a:lnSpc>
+              <a:spcBef>
+                <a:spcPts val="0"/>
+              </a:spcBef>
+              <a:spcAft>
+                <a:spcPts val="0"/>
+              </a:spcAft>
+              <a:buClrTx/>
+              <a:buSzTx/>
+              <a:buFontTx/>
+              <a:buNone/>
+              <a:tabLst/>
+              <a:defRPr/>
+            </a:pPr>
+            <a:r>
+              <a:rPr lang="de-DE" dirty="0"/>
+              <a:t>Vor dem Download des Launcher sollte die Cashbox neue zusammengebaut werden („</a:t>
+            </a:r>
+            <a:r>
+              <a:rPr lang="de-DE" dirty="0" err="1"/>
+              <a:t>Rebuild</a:t>
+            </a:r>
+            <a:r>
+              <a:rPr lang="de-DE" dirty="0"/>
+              <a:t> </a:t>
+            </a:r>
+            <a:r>
+              <a:rPr lang="de-DE" dirty="0" err="1"/>
+              <a:t>configuration</a:t>
+            </a:r>
+            <a:r>
+              <a:rPr lang="de-DE" dirty="0"/>
+              <a:t>“) Button um sicher zu sein, dass zwischenzeitlich vorgenommene Änderungen an der Konfiguration auch angewendet werden. </a:t>
+            </a:r>
+          </a:p>
+          <a:p>
+            <a:pPr marL="0" marR="0" lvl="0" indent="0" algn="l" defTabSz="914400" rtl="0" eaLnBrk="1" fontAlgn="auto" latinLnBrk="0" hangingPunct="1">
+              <a:lnSpc>
+                <a:spcPct val="100000"/>
+              </a:lnSpc>
+              <a:spcBef>
+                <a:spcPts val="0"/>
+              </a:spcBef>
+              <a:spcAft>
+                <a:spcPts val="0"/>
+              </a:spcAft>
+              <a:buClrTx/>
+              <a:buSzTx/>
+              <a:buFontTx/>
+              <a:buNone/>
+              <a:tabLst/>
+              <a:defRPr/>
+            </a:pPr>
+            <a:endParaRPr lang="de-DE" dirty="0"/>
+          </a:p>
+          <a:p>
+            <a:pPr marL="0" marR="0" lvl="0" indent="0" algn="l" defTabSz="914400" rtl="0" eaLnBrk="1" fontAlgn="auto" latinLnBrk="0" hangingPunct="1">
+              <a:lnSpc>
+                <a:spcPct val="100000"/>
+              </a:lnSpc>
+              <a:spcBef>
+                <a:spcPts val="0"/>
+              </a:spcBef>
+              <a:spcAft>
+                <a:spcPts val="0"/>
+              </a:spcAft>
+              <a:buClrTx/>
+              <a:buSzTx/>
+              <a:buFontTx/>
+              <a:buNone/>
+              <a:tabLst/>
+              <a:defRPr/>
+            </a:pPr>
+            <a:r>
+              <a:rPr lang="de-DE" dirty="0"/>
+              <a:t>Download und Start des Launcher (</a:t>
+            </a:r>
+            <a:r>
+              <a:rPr lang="de-DE" dirty="0" err="1"/>
+              <a:t>fiskaltrust.exe</a:t>
+            </a:r>
+            <a:r>
+              <a:rPr lang="de-DE" dirty="0"/>
+              <a:t>). Bei Start des Launcher wird die Konfiguration der enthaltenen </a:t>
+            </a:r>
+            <a:r>
+              <a:rPr lang="de-DE" dirty="0" err="1"/>
+              <a:t>fiskaltrust.Middelware</a:t>
+            </a:r>
+            <a:r>
+              <a:rPr lang="de-DE" dirty="0"/>
+              <a:t> vorgenommen und die </a:t>
+            </a:r>
+            <a:r>
+              <a:rPr lang="de-DE" dirty="0" err="1"/>
+              <a:t>fiskaltrust.Middelware</a:t>
+            </a:r>
+            <a:r>
+              <a:rPr lang="de-DE" dirty="0"/>
+              <a:t> wird danach als Service gestartet.</a:t>
+            </a:r>
+          </a:p>
+          <a:p>
+            <a:pPr marL="0" marR="0" lvl="0" indent="0" algn="l" defTabSz="914400" rtl="0" eaLnBrk="1" fontAlgn="auto" latinLnBrk="0" hangingPunct="1">
+              <a:lnSpc>
+                <a:spcPct val="100000"/>
+              </a:lnSpc>
+              <a:spcBef>
+                <a:spcPts val="0"/>
+              </a:spcBef>
+              <a:spcAft>
+                <a:spcPts val="0"/>
+              </a:spcAft>
+              <a:buClrTx/>
+              <a:buSzTx/>
+              <a:buFontTx/>
+              <a:buNone/>
+              <a:tabLst/>
+              <a:defRPr/>
+            </a:pPr>
+            <a:endParaRPr lang="de-DE" dirty="0"/>
+          </a:p>
+          <a:p>
+            <a:pPr marL="0" marR="0" lvl="0" indent="0" algn="l" defTabSz="914400" rtl="0" eaLnBrk="1" fontAlgn="auto" latinLnBrk="0" hangingPunct="1">
+              <a:lnSpc>
+                <a:spcPct val="100000"/>
+              </a:lnSpc>
+              <a:spcBef>
+                <a:spcPts val="0"/>
+              </a:spcBef>
+              <a:spcAft>
+                <a:spcPts val="0"/>
+              </a:spcAft>
+              <a:buClrTx/>
+              <a:buSzTx/>
+              <a:buFontTx/>
+              <a:buNone/>
+              <a:tabLst/>
+              <a:defRPr/>
+            </a:pPr>
+            <a:r>
+              <a:rPr lang="de-DE" dirty="0"/>
+              <a:t>Die „</a:t>
+            </a:r>
+            <a:r>
+              <a:rPr lang="de-DE" dirty="0" err="1"/>
+              <a:t>Rebuild</a:t>
+            </a:r>
+            <a:r>
+              <a:rPr lang="de-DE" dirty="0"/>
+              <a:t> </a:t>
+            </a:r>
+            <a:r>
+              <a:rPr lang="de-DE" dirty="0" err="1"/>
+              <a:t>Configuration</a:t>
+            </a:r>
+            <a:r>
+              <a:rPr lang="de-DE" dirty="0"/>
+              <a:t>“ Funktionalität wird auch zum Aktualisieren einer bereits ausgelieferten </a:t>
+            </a:r>
+            <a:r>
+              <a:rPr lang="de-DE" dirty="0" err="1"/>
+              <a:t>fiskaltrust.Middlware</a:t>
+            </a:r>
+            <a:r>
+              <a:rPr lang="de-DE" dirty="0"/>
+              <a:t> Instanz verwendet. Wird die Cashbox aktualisiert, der „</a:t>
+            </a:r>
+            <a:r>
+              <a:rPr lang="de-DE" dirty="0" err="1"/>
+              <a:t>Rebuild</a:t>
+            </a:r>
+            <a:r>
+              <a:rPr lang="de-DE" dirty="0"/>
+              <a:t> </a:t>
+            </a:r>
+            <a:r>
+              <a:rPr lang="de-DE" dirty="0" err="1"/>
+              <a:t>Configuration</a:t>
+            </a:r>
+            <a:r>
+              <a:rPr lang="de-DE" dirty="0"/>
+              <a:t>“  Button gedrückt und der Launcher neu gestartet, so lädt sich dieser automatisch die neue Konfiguration herunter und wendet diese an.</a:t>
+            </a:r>
+          </a:p>
+          <a:p>
+            <a:pPr marL="0" marR="0" lvl="0" indent="0" algn="l" defTabSz="914400" rtl="0" eaLnBrk="1" fontAlgn="auto" latinLnBrk="0" hangingPunct="1">
+              <a:lnSpc>
+                <a:spcPct val="100000"/>
+              </a:lnSpc>
+              <a:spcBef>
+                <a:spcPts val="0"/>
+              </a:spcBef>
+              <a:spcAft>
+                <a:spcPts val="0"/>
+              </a:spcAft>
+              <a:buClrTx/>
+              <a:buSzTx/>
+              <a:buFontTx/>
+              <a:buNone/>
+              <a:tabLst/>
+              <a:defRPr/>
+            </a:pPr>
             <a:endParaRPr lang="de-DE" dirty="0"/>
           </a:p>
         </p:txBody>
@@ -5392,7 +6592,7 @@
           <a:p>
             <a:fld id="{37D9B929-EEB3-453F-899C-B5737EAC3251}" type="slidenum">
               <a:rPr lang="de-AT" smtClean="0"/>
-              <a:t>10</a:t>
+              <a:t>7</a:t>
             </a:fld>
             <a:endParaRPr lang="de-AT"/>
           </a:p>
@@ -5401,7 +6601,7 @@
     </p:spTree>
     <p:extLst>
       <p:ext uri="{BB962C8B-B14F-4D97-AF65-F5344CB8AC3E}">
-        <p14:creationId xmlns:p14="http://schemas.microsoft.com/office/powerpoint/2010/main" val="3952619168"/>
+        <p14:creationId xmlns:p14="http://schemas.microsoft.com/office/powerpoint/2010/main" val="3045325266"/>
       </p:ext>
     </p:extLst>
   </p:cSld>
@@ -5455,6 +6655,69 @@
           <a:bodyPr/>
           <a:lstStyle/>
           <a:p>
+            <a:r>
+              <a:rPr lang="de-DE" dirty="0"/>
+              <a:t>Für Massenrollouts bietet fiskaltrust diverse Automatisierungsoptionen. Wir werden im Folgenden die aufgelisteten Punkte vorstellen.</a:t>
+            </a:r>
+          </a:p>
+          <a:p>
+            <a:endParaRPr lang="de-DE" dirty="0"/>
+          </a:p>
+          <a:p>
+            <a:r>
+              <a:rPr lang="de-DE" dirty="0"/>
+              <a:t>Für die weiteren Inhalte zur Präsentation der Automatisierung siehe bitte:</a:t>
+            </a:r>
+          </a:p>
+          <a:p>
+            <a:r>
+              <a:rPr lang="de-DE" dirty="0"/>
+              <a:t>https://</a:t>
+            </a:r>
+            <a:r>
+              <a:rPr lang="de-DE" dirty="0" err="1"/>
+              <a:t>docs.fiskaltrust.cloud</a:t>
+            </a:r>
+            <a:r>
+              <a:rPr lang="de-DE" dirty="0"/>
+              <a:t>/</a:t>
+            </a:r>
+            <a:r>
+              <a:rPr lang="de-DE" dirty="0" err="1"/>
+              <a:t>doc</a:t>
+            </a:r>
+            <a:r>
+              <a:rPr lang="de-DE" dirty="0"/>
+              <a:t>/</a:t>
+            </a:r>
+            <a:r>
+              <a:rPr lang="de-DE" dirty="0" err="1"/>
+              <a:t>productdescription</a:t>
+            </a:r>
+            <a:r>
+              <a:rPr lang="de-DE" dirty="0"/>
+              <a:t>-de-</a:t>
+            </a:r>
+            <a:r>
+              <a:rPr lang="de-DE" dirty="0" err="1"/>
+              <a:t>doc</a:t>
+            </a:r>
+            <a:r>
+              <a:rPr lang="de-DE" dirty="0"/>
+              <a:t>/</a:t>
+            </a:r>
+            <a:r>
+              <a:rPr lang="de-DE" dirty="0" err="1"/>
+              <a:t>for-posdealers</a:t>
+            </a:r>
+            <a:r>
+              <a:rPr lang="de-DE" dirty="0"/>
+              <a:t>/02-pre-sales/automatisierter-</a:t>
+            </a:r>
+            <a:r>
+              <a:rPr lang="de-DE" dirty="0" err="1"/>
+              <a:t>rollout.html</a:t>
+            </a:r>
             <a:endParaRPr lang="de-DE" dirty="0"/>
           </a:p>
         </p:txBody>
@@ -5522,7 +6785,7 @@
           <a:p>
             <a:fld id="{37D9B929-EEB3-453F-899C-B5737EAC3251}" type="slidenum">
               <a:rPr lang="de-AT" smtClean="0"/>
-              <a:t>11</a:t>
+              <a:t>8</a:t>
             </a:fld>
             <a:endParaRPr lang="de-AT"/>
           </a:p>
@@ -5531,7 +6794,7 @@
     </p:spTree>
     <p:extLst>
       <p:ext uri="{BB962C8B-B14F-4D97-AF65-F5344CB8AC3E}">
-        <p14:creationId xmlns:p14="http://schemas.microsoft.com/office/powerpoint/2010/main" val="1480655448"/>
+        <p14:creationId xmlns:p14="http://schemas.microsoft.com/office/powerpoint/2010/main" val="3975435480"/>
       </p:ext>
     </p:extLst>
   </p:cSld>
@@ -5652,7 +6915,7 @@
           <a:p>
             <a:fld id="{37D9B929-EEB3-453F-899C-B5737EAC3251}" type="slidenum">
               <a:rPr lang="de-AT" smtClean="0"/>
-              <a:t>15</a:t>
+              <a:t>9</a:t>
             </a:fld>
             <a:endParaRPr lang="de-AT"/>
           </a:p>
@@ -5661,7 +6924,7 @@
     </p:spTree>
     <p:extLst>
       <p:ext uri="{BB962C8B-B14F-4D97-AF65-F5344CB8AC3E}">
-        <p14:creationId xmlns:p14="http://schemas.microsoft.com/office/powerpoint/2010/main" val="1458951094"/>
+        <p14:creationId xmlns:p14="http://schemas.microsoft.com/office/powerpoint/2010/main" val="1809690114"/>
       </p:ext>
     </p:extLst>
   </p:cSld>
@@ -5782,7 +7045,7 @@
           <a:p>
             <a:fld id="{37D9B929-EEB3-453F-899C-B5737EAC3251}" type="slidenum">
               <a:rPr lang="de-AT" smtClean="0"/>
-              <a:t>17</a:t>
+              <a:t>10</a:t>
             </a:fld>
             <a:endParaRPr lang="de-AT"/>
           </a:p>
@@ -5791,7 +7054,7 @@
     </p:spTree>
     <p:extLst>
       <p:ext uri="{BB962C8B-B14F-4D97-AF65-F5344CB8AC3E}">
-        <p14:creationId xmlns:p14="http://schemas.microsoft.com/office/powerpoint/2010/main" val="385413735"/>
+        <p14:creationId xmlns:p14="http://schemas.microsoft.com/office/powerpoint/2010/main" val="3952619168"/>
       </p:ext>
     </p:extLst>
   </p:cSld>
@@ -10270,6 +11533,348 @@
 </p:sld>
 </file>
 
+<file path=ppt/slides/slide21.xml><?xml version="1.0" encoding="utf-8"?>
+<p:sld xmlns:a="http://schemas.openxmlformats.org/drawingml/2006/main" xmlns:r="http://schemas.openxmlformats.org/officeDocument/2006/relationships" xmlns:p="http://schemas.openxmlformats.org/presentationml/2006/main">
+  <p:cSld>
+    <p:spTree>
+      <p:nvGrpSpPr>
+        <p:cNvPr id="1" name=""/>
+        <p:cNvGrpSpPr/>
+        <p:nvPr/>
+      </p:nvGrpSpPr>
+      <p:grpSpPr>
+        <a:xfrm>
+          <a:off x="0" y="0"/>
+          <a:ext cx="0" cy="0"/>
+          <a:chOff x="0" y="0"/>
+          <a:chExt cx="0" cy="0"/>
+        </a:xfrm>
+      </p:grpSpPr>
+      <p:sp>
+        <p:nvSpPr>
+          <p:cNvPr id="6" name="Title 5">
+            <a:extLst>
+              <a:ext uri="{FF2B5EF4-FFF2-40B4-BE49-F238E27FC236}">
+                <a16:creationId xmlns:a16="http://schemas.microsoft.com/office/drawing/2014/main" id="{338CAE8C-33A4-DF45-A359-E727EE9AFE7B}"/>
+              </a:ext>
+            </a:extLst>
+          </p:cNvPr>
+          <p:cNvSpPr>
+            <a:spLocks noGrp="1"/>
+          </p:cNvSpPr>
+          <p:nvPr>
+            <p:ph type="title"/>
+          </p:nvPr>
+        </p:nvSpPr>
+        <p:spPr/>
+        <p:txBody>
+          <a:bodyPr/>
+          <a:lstStyle/>
+          <a:p>
+            <a:r>
+              <a:rPr lang="de-DE" dirty="0"/>
+              <a:t>Rollout Szenarien</a:t>
+            </a:r>
+          </a:p>
+        </p:txBody>
+      </p:sp>
+      <p:sp>
+        <p:nvSpPr>
+          <p:cNvPr id="7" name="Content Placeholder 6">
+            <a:extLst>
+              <a:ext uri="{FF2B5EF4-FFF2-40B4-BE49-F238E27FC236}">
+                <a16:creationId xmlns:a16="http://schemas.microsoft.com/office/drawing/2014/main" id="{4DE78D6A-7D77-8B48-A7A2-AD18A97D6DEF}"/>
+              </a:ext>
+            </a:extLst>
+          </p:cNvPr>
+          <p:cNvSpPr>
+            <a:spLocks noGrp="1"/>
+          </p:cNvSpPr>
+          <p:nvPr>
+            <p:ph idx="1"/>
+          </p:nvPr>
+        </p:nvSpPr>
+        <p:spPr/>
+        <p:txBody>
+          <a:bodyPr>
+            <a:normAutofit/>
+          </a:bodyPr>
+          <a:lstStyle/>
+          <a:p>
+            <a:pPr marL="0" indent="0">
+              <a:buNone/>
+            </a:pPr>
+            <a:endParaRPr lang="de-DE" dirty="0"/>
+          </a:p>
+          <a:p>
+            <a:pPr>
+              <a:buFont typeface="Arial" panose="020B0604020202020204" pitchFamily="34" charset="0"/>
+              <a:buChar char="•"/>
+            </a:pPr>
+            <a:r>
+              <a:rPr lang="de-DE" dirty="0">
+                <a:hlinkClick r:id="rId3"/>
+              </a:rPr>
+              <a:t>Vorführung anhand der Dokumentation</a:t>
+            </a:r>
+            <a:endParaRPr lang="de-DE" dirty="0"/>
+          </a:p>
+          <a:p>
+            <a:pPr>
+              <a:buFont typeface="Arial" panose="020B0604020202020204" pitchFamily="34" charset="0"/>
+              <a:buChar char="•"/>
+            </a:pPr>
+            <a:endParaRPr lang="de-DE" dirty="0"/>
+          </a:p>
+        </p:txBody>
+      </p:sp>
+      <p:sp>
+        <p:nvSpPr>
+          <p:cNvPr id="5" name="Slide Number Placeholder 4">
+            <a:extLst>
+              <a:ext uri="{FF2B5EF4-FFF2-40B4-BE49-F238E27FC236}">
+                <a16:creationId xmlns:a16="http://schemas.microsoft.com/office/drawing/2014/main" id="{9E72C518-5CFD-B948-B93E-B76473C6D205}"/>
+              </a:ext>
+            </a:extLst>
+          </p:cNvPr>
+          <p:cNvSpPr>
+            <a:spLocks noGrp="1"/>
+          </p:cNvSpPr>
+          <p:nvPr>
+            <p:ph type="sldNum" sz="quarter" idx="12"/>
+          </p:nvPr>
+        </p:nvSpPr>
+        <p:spPr/>
+        <p:txBody>
+          <a:bodyPr/>
+          <a:lstStyle/>
+          <a:p>
+            <a:fld id="{0191866A-0B7B-4277-9FEF-8CF0281B370B}" type="slidenum">
+              <a:rPr lang="de-AT" smtClean="0"/>
+              <a:pPr/>
+              <a:t>21</a:t>
+            </a:fld>
+            <a:endParaRPr lang="de-AT" dirty="0"/>
+          </a:p>
+        </p:txBody>
+      </p:sp>
+      <p:sp>
+        <p:nvSpPr>
+          <p:cNvPr id="4" name="Footer Placeholder 3">
+            <a:extLst>
+              <a:ext uri="{FF2B5EF4-FFF2-40B4-BE49-F238E27FC236}">
+                <a16:creationId xmlns:a16="http://schemas.microsoft.com/office/drawing/2014/main" id="{5CD35D5E-AF9E-454B-A2D5-C72DEC58B858}"/>
+              </a:ext>
+            </a:extLst>
+          </p:cNvPr>
+          <p:cNvSpPr>
+            <a:spLocks noGrp="1"/>
+          </p:cNvSpPr>
+          <p:nvPr>
+            <p:ph type="ftr" sz="quarter" idx="4294967295"/>
+          </p:nvPr>
+        </p:nvSpPr>
+        <p:spPr>
+          <a:xfrm>
+            <a:off x="0" y="6427788"/>
+            <a:ext cx="6643688" cy="365125"/>
+          </a:xfrm>
+        </p:spPr>
+        <p:txBody>
+          <a:bodyPr/>
+          <a:lstStyle/>
+          <a:p>
+            <a:r>
+              <a:rPr lang="de-AT" dirty="0"/>
+              <a:t>fiskaltrust.</a:t>
+            </a:r>
+          </a:p>
+        </p:txBody>
+      </p:sp>
+    </p:spTree>
+    <p:extLst>
+      <p:ext uri="{BB962C8B-B14F-4D97-AF65-F5344CB8AC3E}">
+        <p14:creationId xmlns:p14="http://schemas.microsoft.com/office/powerpoint/2010/main" val="1540515374"/>
+      </p:ext>
+    </p:extLst>
+  </p:cSld>
+  <p:clrMapOvr>
+    <a:masterClrMapping/>
+  </p:clrMapOvr>
+</p:sld>
+</file>
+
+<file path=ppt/slides/slide22.xml><?xml version="1.0" encoding="utf-8"?>
+<p:sld xmlns:a="http://schemas.openxmlformats.org/drawingml/2006/main" xmlns:r="http://schemas.openxmlformats.org/officeDocument/2006/relationships" xmlns:p="http://schemas.openxmlformats.org/presentationml/2006/main">
+  <p:cSld>
+    <p:spTree>
+      <p:nvGrpSpPr>
+        <p:cNvPr id="1" name=""/>
+        <p:cNvGrpSpPr/>
+        <p:nvPr/>
+      </p:nvGrpSpPr>
+      <p:grpSpPr>
+        <a:xfrm>
+          <a:off x="0" y="0"/>
+          <a:ext cx="0" cy="0"/>
+          <a:chOff x="0" y="0"/>
+          <a:chExt cx="0" cy="0"/>
+        </a:xfrm>
+      </p:grpSpPr>
+      <p:sp>
+        <p:nvSpPr>
+          <p:cNvPr id="6" name="Title 5">
+            <a:extLst>
+              <a:ext uri="{FF2B5EF4-FFF2-40B4-BE49-F238E27FC236}">
+                <a16:creationId xmlns:a16="http://schemas.microsoft.com/office/drawing/2014/main" id="{338CAE8C-33A4-DF45-A359-E727EE9AFE7B}"/>
+              </a:ext>
+            </a:extLst>
+          </p:cNvPr>
+          <p:cNvSpPr>
+            <a:spLocks noGrp="1"/>
+          </p:cNvSpPr>
+          <p:nvPr>
+            <p:ph type="title"/>
+          </p:nvPr>
+        </p:nvSpPr>
+        <p:spPr/>
+        <p:txBody>
+          <a:bodyPr/>
+          <a:lstStyle/>
+          <a:p>
+            <a:r>
+              <a:rPr lang="de-DE" dirty="0"/>
+              <a:t>Nächste Schritte</a:t>
+            </a:r>
+          </a:p>
+        </p:txBody>
+      </p:sp>
+      <p:sp>
+        <p:nvSpPr>
+          <p:cNvPr id="7" name="Content Placeholder 6">
+            <a:extLst>
+              <a:ext uri="{FF2B5EF4-FFF2-40B4-BE49-F238E27FC236}">
+                <a16:creationId xmlns:a16="http://schemas.microsoft.com/office/drawing/2014/main" id="{4DE78D6A-7D77-8B48-A7A2-AD18A97D6DEF}"/>
+              </a:ext>
+            </a:extLst>
+          </p:cNvPr>
+          <p:cNvSpPr>
+            <a:spLocks noGrp="1"/>
+          </p:cNvSpPr>
+          <p:nvPr>
+            <p:ph idx="1"/>
+          </p:nvPr>
+        </p:nvSpPr>
+        <p:spPr/>
+        <p:txBody>
+          <a:bodyPr>
+            <a:normAutofit/>
+          </a:bodyPr>
+          <a:lstStyle/>
+          <a:p>
+            <a:pPr marL="0" indent="0">
+              <a:buNone/>
+            </a:pPr>
+            <a:endParaRPr lang="de-DE" dirty="0"/>
+          </a:p>
+          <a:p>
+            <a:pPr>
+              <a:buFont typeface="Arial" panose="020B0604020202020204" pitchFamily="34" charset="0"/>
+              <a:buChar char="•"/>
+            </a:pPr>
+            <a:r>
+              <a:rPr lang="de-DE" dirty="0">
+                <a:hlinkClick r:id="rId3"/>
+              </a:rPr>
+              <a:t>Getting Started für Kassenhändler</a:t>
+            </a:r>
+            <a:endParaRPr lang="de-DE" dirty="0"/>
+          </a:p>
+          <a:p>
+            <a:pPr>
+              <a:buFont typeface="Arial" panose="020B0604020202020204" pitchFamily="34" charset="0"/>
+              <a:buChar char="•"/>
+            </a:pPr>
+            <a:endParaRPr lang="de-DE" dirty="0"/>
+          </a:p>
+        </p:txBody>
+      </p:sp>
+      <p:sp>
+        <p:nvSpPr>
+          <p:cNvPr id="5" name="Slide Number Placeholder 4">
+            <a:extLst>
+              <a:ext uri="{FF2B5EF4-FFF2-40B4-BE49-F238E27FC236}">
+                <a16:creationId xmlns:a16="http://schemas.microsoft.com/office/drawing/2014/main" id="{9E72C518-5CFD-B948-B93E-B76473C6D205}"/>
+              </a:ext>
+            </a:extLst>
+          </p:cNvPr>
+          <p:cNvSpPr>
+            <a:spLocks noGrp="1"/>
+          </p:cNvSpPr>
+          <p:nvPr>
+            <p:ph type="sldNum" sz="quarter" idx="12"/>
+          </p:nvPr>
+        </p:nvSpPr>
+        <p:spPr/>
+        <p:txBody>
+          <a:bodyPr/>
+          <a:lstStyle/>
+          <a:p>
+            <a:fld id="{0191866A-0B7B-4277-9FEF-8CF0281B370B}" type="slidenum">
+              <a:rPr lang="de-AT" smtClean="0"/>
+              <a:pPr/>
+              <a:t>22</a:t>
+            </a:fld>
+            <a:endParaRPr lang="de-AT" dirty="0"/>
+          </a:p>
+        </p:txBody>
+      </p:sp>
+      <p:sp>
+        <p:nvSpPr>
+          <p:cNvPr id="4" name="Footer Placeholder 3">
+            <a:extLst>
+              <a:ext uri="{FF2B5EF4-FFF2-40B4-BE49-F238E27FC236}">
+                <a16:creationId xmlns:a16="http://schemas.microsoft.com/office/drawing/2014/main" id="{5CD35D5E-AF9E-454B-A2D5-C72DEC58B858}"/>
+              </a:ext>
+            </a:extLst>
+          </p:cNvPr>
+          <p:cNvSpPr>
+            <a:spLocks noGrp="1"/>
+          </p:cNvSpPr>
+          <p:nvPr>
+            <p:ph type="ftr" sz="quarter" idx="4294967295"/>
+          </p:nvPr>
+        </p:nvSpPr>
+        <p:spPr>
+          <a:xfrm>
+            <a:off x="0" y="6427788"/>
+            <a:ext cx="6643688" cy="365125"/>
+          </a:xfrm>
+        </p:spPr>
+        <p:txBody>
+          <a:bodyPr/>
+          <a:lstStyle/>
+          <a:p>
+            <a:r>
+              <a:rPr lang="de-AT" dirty="0"/>
+              <a:t>fiskaltrust.</a:t>
+            </a:r>
+          </a:p>
+        </p:txBody>
+      </p:sp>
+    </p:spTree>
+    <p:extLst>
+      <p:ext uri="{BB962C8B-B14F-4D97-AF65-F5344CB8AC3E}">
+        <p14:creationId xmlns:p14="http://schemas.microsoft.com/office/powerpoint/2010/main" val="1836380073"/>
+      </p:ext>
+    </p:extLst>
+  </p:cSld>
+  <p:clrMapOvr>
+    <a:masterClrMapping/>
+  </p:clrMapOvr>
+</p:sld>
+</file>
+
 <file path=ppt/slides/slide3.xml><?xml version="1.0" encoding="utf-8"?>
 <p:sld xmlns:a="http://schemas.openxmlformats.org/drawingml/2006/main" xmlns:r="http://schemas.openxmlformats.org/officeDocument/2006/relationships" xmlns:p="http://schemas.openxmlformats.org/presentationml/2006/main">
   <p:cSld>
@@ -11053,23 +12658,7 @@
             </a:pPr>
             <a:r>
               <a:rPr lang="de-DE" dirty="0"/>
-              <a:t>„</a:t>
-            </a:r>
-            <a:r>
-              <a:rPr lang="de-DE" dirty="0" err="1"/>
-              <a:t>Rebuild</a:t>
-            </a:r>
-            <a:r>
-              <a:rPr lang="de-DE" dirty="0"/>
-              <a:t> </a:t>
-            </a:r>
-            <a:r>
-              <a:rPr lang="de-DE" dirty="0" err="1"/>
-              <a:t>configuration</a:t>
-            </a:r>
-            <a:r>
-              <a:rPr lang="de-DE" dirty="0"/>
-              <a:t>“</a:t>
+              <a:t>Online Launcher vs. Offline Launcher</a:t>
             </a:r>
           </a:p>
           <a:p>
@@ -11079,7 +12668,23 @@
             </a:pPr>
             <a:r>
               <a:rPr lang="de-DE" dirty="0"/>
-              <a:t>Online Launcher vs. Offline Launcher</a:t>
+              <a:t>„</a:t>
+            </a:r>
+            <a:r>
+              <a:rPr lang="de-DE" dirty="0" err="1"/>
+              <a:t>Rebuild</a:t>
+            </a:r>
+            <a:r>
+              <a:rPr lang="de-DE" dirty="0"/>
+              <a:t> </a:t>
+            </a:r>
+            <a:r>
+              <a:rPr lang="de-DE" dirty="0" err="1"/>
+              <a:t>configuration</a:t>
+            </a:r>
+            <a:r>
+              <a:rPr lang="de-DE" dirty="0"/>
+              <a:t>“</a:t>
             </a:r>
           </a:p>
           <a:p>
@@ -12468,6 +14073,27 @@
 </file>
 
 <file path=customXml/item1.xml><?xml version="1.0" encoding="utf-8"?>
+<?mso-contentType ?>
+<FormTemplates xmlns="http://schemas.microsoft.com/sharepoint/v3/contenttype/forms">
+  <Display>DocumentLibraryForm</Display>
+  <Edit>DocumentLibraryForm</Edit>
+  <New>DocumentLibraryForm</New>
+</FormTemplates>
+</file>
+
+<file path=customXml/item2.xml><?xml version="1.0" encoding="utf-8"?>
+<p:properties xmlns:p="http://schemas.microsoft.com/office/2006/metadata/properties" xmlns:xsi="http://www.w3.org/2001/XMLSchema-instance" xmlns:pc="http://schemas.microsoft.com/office/infopath/2007/PartnerControls">
+  <documentManagement>
+    <MigrationWizIdPermissions xmlns="86d55d5a-583b-4ffa-ba38-1d7d24766b92" xsi:nil="true"/>
+    <MigrationWizIdSecurityGroups xmlns="86d55d5a-583b-4ffa-ba38-1d7d24766b92" xsi:nil="true"/>
+    <MigrationWizIdPermissionLevels xmlns="86d55d5a-583b-4ffa-ba38-1d7d24766b92" xsi:nil="true"/>
+    <MigrationWizId xmlns="86d55d5a-583b-4ffa-ba38-1d7d24766b92" xsi:nil="true"/>
+    <MigrationWizIdDocumentLibraryPermissions xmlns="86d55d5a-583b-4ffa-ba38-1d7d24766b92" xsi:nil="true"/>
+  </documentManagement>
+</p:properties>
+</file>
+
+<file path=customXml/item3.xml><?xml version="1.0" encoding="utf-8"?>
 <ct:contentTypeSchema xmlns:ct="http://schemas.microsoft.com/office/2006/metadata/contentType" xmlns:ma="http://schemas.microsoft.com/office/2006/metadata/properties/metaAttributes" ct:_="" ma:_="" ma:contentTypeName="Dokument" ma:contentTypeID="0x010100EDDAB4B22929B54F9C6B97FCF3506A69" ma:contentTypeVersion="18" ma:contentTypeDescription="Ein neues Dokument erstellen." ma:contentTypeScope="" ma:versionID="48f0b89e718592fa7287d62064933d84">
   <xsd:schema xmlns:xsd="http://www.w3.org/2001/XMLSchema" xmlns:xs="http://www.w3.org/2001/XMLSchema" xmlns:p="http://schemas.microsoft.com/office/2006/metadata/properties" xmlns:ns3="86d55d5a-583b-4ffa-ba38-1d7d24766b92" xmlns:ns4="79e3e85f-1e38-4ceb-855f-9704f5188ae9" targetNamespace="http://schemas.microsoft.com/office/2006/metadata/properties" ma:root="true" ma:fieldsID="756dd8eefc7eaabc214879ed16408efd" ns3:_="" ns4:_="">
     <xsd:import namespace="86d55d5a-583b-4ffa-ba38-1d7d24766b92"/>
@@ -12720,28 +14346,25 @@
 </ct:contentTypeSchema>
 </file>
 
-<file path=customXml/item2.xml><?xml version="1.0" encoding="utf-8"?>
-<p:properties xmlns:p="http://schemas.microsoft.com/office/2006/metadata/properties" xmlns:xsi="http://www.w3.org/2001/XMLSchema-instance" xmlns:pc="http://schemas.microsoft.com/office/infopath/2007/PartnerControls">
-  <documentManagement>
-    <MigrationWizIdPermissions xmlns="86d55d5a-583b-4ffa-ba38-1d7d24766b92" xsi:nil="true"/>
-    <MigrationWizIdSecurityGroups xmlns="86d55d5a-583b-4ffa-ba38-1d7d24766b92" xsi:nil="true"/>
-    <MigrationWizIdPermissionLevels xmlns="86d55d5a-583b-4ffa-ba38-1d7d24766b92" xsi:nil="true"/>
-    <MigrationWizId xmlns="86d55d5a-583b-4ffa-ba38-1d7d24766b92" xsi:nil="true"/>
-    <MigrationWizIdDocumentLibraryPermissions xmlns="86d55d5a-583b-4ffa-ba38-1d7d24766b92" xsi:nil="true"/>
-  </documentManagement>
-</p:properties>
+<file path=customXml/itemProps1.xml><?xml version="1.0" encoding="utf-8"?>
+<ds:datastoreItem xmlns:ds="http://schemas.openxmlformats.org/officeDocument/2006/customXml" ds:itemID="{3F407387-4BEA-45E7-A546-EAF24BCEADF4}">
+  <ds:schemaRefs>
+    <ds:schemaRef ds:uri="http://schemas.microsoft.com/sharepoint/v3/contenttype/forms"/>
+  </ds:schemaRefs>
+</ds:datastoreItem>
 </file>
 
-<file path=customXml/item3.xml><?xml version="1.0" encoding="utf-8"?>
-<?mso-contentType ?>
-<FormTemplates xmlns="http://schemas.microsoft.com/sharepoint/v3/contenttype/forms">
-  <Display>DocumentLibraryForm</Display>
-  <Edit>DocumentLibraryForm</Edit>
-  <New>DocumentLibraryForm</New>
-</FormTemplates>
+<file path=customXml/itemProps2.xml><?xml version="1.0" encoding="utf-8"?>
+<ds:datastoreItem xmlns:ds="http://schemas.openxmlformats.org/officeDocument/2006/customXml" ds:itemID="{A770BCC9-0480-4A5F-A5A5-05648EB42497}">
+  <ds:schemaRefs>
+    <ds:schemaRef ds:uri="http://schemas.microsoft.com/office/2006/metadata/properties"/>
+    <ds:schemaRef ds:uri="http://schemas.microsoft.com/office/infopath/2007/PartnerControls"/>
+    <ds:schemaRef ds:uri="86d55d5a-583b-4ffa-ba38-1d7d24766b92"/>
+  </ds:schemaRefs>
+</ds:datastoreItem>
 </file>
 
-<file path=customXml/itemProps1.xml><?xml version="1.0" encoding="utf-8"?>
+<file path=customXml/itemProps3.xml><?xml version="1.0" encoding="utf-8"?>
 <ds:datastoreItem xmlns:ds="http://schemas.openxmlformats.org/officeDocument/2006/customXml" ds:itemID="{C858B782-02BD-4534-B5E2-DFF71202A804}">
   <ds:schemaRefs>
     <ds:schemaRef ds:uri="http://schemas.microsoft.com/office/2006/metadata/contentType"/>
@@ -12758,22 +14381,4 @@
     <ds:schemaRef ds:uri="http://schemas.microsoft.com/internal/obd"/>
   </ds:schemaRefs>
 </ds:datastoreItem>
-</file>
-
-<file path=customXml/itemProps2.xml><?xml version="1.0" encoding="utf-8"?>
-<ds:datastoreItem xmlns:ds="http://schemas.openxmlformats.org/officeDocument/2006/customXml" ds:itemID="{A770BCC9-0480-4A5F-A5A5-05648EB42497}">
-  <ds:schemaRefs>
-    <ds:schemaRef ds:uri="http://schemas.microsoft.com/office/2006/metadata/properties"/>
-    <ds:schemaRef ds:uri="http://schemas.microsoft.com/office/infopath/2007/PartnerControls"/>
-    <ds:schemaRef ds:uri="86d55d5a-583b-4ffa-ba38-1d7d24766b92"/>
-  </ds:schemaRefs>
-</ds:datastoreItem>
-</file>
-
-<file path=customXml/itemProps3.xml><?xml version="1.0" encoding="utf-8"?>
-<ds:datastoreItem xmlns:ds="http://schemas.openxmlformats.org/officeDocument/2006/customXml" ds:itemID="{3F407387-4BEA-45E7-A546-EAF24BCEADF4}">
-  <ds:schemaRefs>
-    <ds:schemaRef ds:uri="http://schemas.microsoft.com/sharepoint/v3/contenttype/forms"/>
-  </ds:schemaRefs>
-</ds:datastoreItem>
 </file>
</xml_diff>